<commit_message>
Fixed year in Crypto slides.
</commit_message>
<xml_diff>
--- a/AISA CISSP - Cryptography.pptx
+++ b/AISA CISSP - Cryptography.pptx
@@ -14101,7 +14101,11 @@
             </a:pPr>
             <a:r>
               <a:rPr lang="en-AU" dirty="0" smtClean="0"/>
-              <a:t>2011 – Cryptography</a:t>
+              <a:t>2013 </a:t>
+            </a:r>
+            <a:r>
+              <a:rPr lang="en-AU" dirty="0" smtClean="0"/>
+              <a:t>– Cryptography</a:t>
             </a:r>
           </a:p>
           <a:p>
@@ -14111,7 +14115,15 @@
             </a:pPr>
             <a:r>
               <a:rPr lang="en-AU" sz="1600" dirty="0" smtClean="0"/>
-              <a:t>All content ©2010-11  Australian Information Security Association. </a:t>
+              <a:t>All content ©</a:t>
+            </a:r>
+            <a:r>
+              <a:rPr lang="en-AU" sz="1600" dirty="0" smtClean="0"/>
+              <a:t>2010-13  </a:t>
+            </a:r>
+            <a:r>
+              <a:rPr lang="en-AU" sz="1600" dirty="0" smtClean="0"/>
+              <a:t>Australian Information Security Association. </a:t>
             </a:r>
           </a:p>
           <a:p>
@@ -30901,11 +30913,7 @@
             <a:pPr lvl="1"/>
             <a:r>
               <a:rPr lang="en-AU" dirty="0" smtClean="0"/>
-              <a:t>Fire </a:t>
-            </a:r>
-            <a:r>
-              <a:rPr lang="en-AU" dirty="0" smtClean="0"/>
-              <a:t>Exits</a:t>
+              <a:t>Fire Exits</a:t>
             </a:r>
           </a:p>
           <a:p>
@@ -30919,13 +30927,8 @@
             <a:pPr eaLnBrk="1" hangingPunct="1"/>
             <a:r>
               <a:rPr lang="en-AU" dirty="0" smtClean="0"/>
-              <a:t>Mobile Phones (discrete</a:t>
-            </a:r>
-            <a:r>
-              <a:rPr lang="en-AU" dirty="0" smtClean="0"/>
-              <a:t>)</a:t>
-            </a:r>
-            <a:endParaRPr lang="en-AU" dirty="0" smtClean="0"/>
+              <a:t>Mobile Phones (discrete)</a:t>
+            </a:r>
           </a:p>
         </p:txBody>
       </p:sp>

</xml_diff>

<commit_message>
Added links to slides.
</commit_message>
<xml_diff>
--- a/AISA CISSP - Cryptography.pptx
+++ b/AISA CISSP - Cryptography.pptx
@@ -14101,11 +14101,7 @@
             </a:pPr>
             <a:r>
               <a:rPr lang="en-AU" dirty="0" smtClean="0"/>
-              <a:t>2013 </a:t>
-            </a:r>
-            <a:r>
-              <a:rPr lang="en-AU" dirty="0" smtClean="0"/>
-              <a:t>– Cryptography</a:t>
+              <a:t>2013 – Cryptography</a:t>
             </a:r>
           </a:p>
           <a:p>
@@ -14115,15 +14111,7 @@
             </a:pPr>
             <a:r>
               <a:rPr lang="en-AU" sz="1600" dirty="0" smtClean="0"/>
-              <a:t>All content ©</a:t>
-            </a:r>
-            <a:r>
-              <a:rPr lang="en-AU" sz="1600" dirty="0" smtClean="0"/>
-              <a:t>2010-13  </a:t>
-            </a:r>
-            <a:r>
-              <a:rPr lang="en-AU" sz="1600" dirty="0" smtClean="0"/>
-              <a:t>Australian Information Security Association. </a:t>
+              <a:t>All content ©2010-13  Australian Information Security Association. </a:t>
             </a:r>
           </a:p>
           <a:p>
@@ -30883,7 +30871,7 @@
             <a:prstTxWarp prst="textNoShape">
               <a:avLst/>
             </a:prstTxWarp>
-            <a:normAutofit/>
+            <a:normAutofit fontScale="92500" lnSpcReduction="20000"/>
           </a:bodyPr>
           <a:lstStyle/>
           <a:p>
@@ -30927,8 +30915,39 @@
             <a:pPr eaLnBrk="1" hangingPunct="1"/>
             <a:r>
               <a:rPr lang="en-AU" dirty="0" smtClean="0"/>
-              <a:t>Mobile Phones (discrete)</a:t>
-            </a:r>
+              <a:t>Mobile Phones (discrete</a:t>
+            </a:r>
+            <a:r>
+              <a:rPr lang="en-AU" dirty="0" smtClean="0"/>
+              <a:t>)</a:t>
+            </a:r>
+          </a:p>
+          <a:p>
+            <a:r>
+              <a:rPr lang="en-AU" smtClean="0"/>
+              <a:t>These slides </a:t>
+            </a:r>
+            <a:r>
+              <a:rPr lang="en-AU" dirty="0"/>
+              <a:t>available at </a:t>
+            </a:r>
+            <a:r>
+              <a:rPr lang="en-AU" dirty="0">
+                <a:hlinkClick r:id="rId4"/>
+              </a:rPr>
+              <a:t>https://github.com/anthonylangsworth/AISACISSP/blob/master/AISA%20CISSP%20-%</a:t>
+            </a:r>
+            <a:r>
+              <a:rPr lang="en-AU" dirty="0" smtClean="0">
+                <a:hlinkClick r:id="rId4"/>
+              </a:rPr>
+              <a:t>20Cryptography.pptx?raw=true</a:t>
+            </a:r>
+            <a:r>
+              <a:rPr lang="en-AU" dirty="0" smtClean="0"/>
+              <a:t> </a:t>
+            </a:r>
+            <a:endParaRPr lang="en-AU" dirty="0" smtClean="0"/>
           </a:p>
         </p:txBody>
       </p:sp>

</xml_diff>